<commit_message>
corrected code and slides to use the right w
</commit_message>
<xml_diff>
--- a/slides/practicals/P7_EESCGU4220_Heat_equation_2023.pptx
+++ b/slides/practicals/P7_EESCGU4220_Heat_equation_2023.pptx
@@ -5,13 +5,12 @@
     <p:sldMasterId id="2147483660" r:id="rId1"/>
   </p:sldMasterIdLst>
   <p:notesMasterIdLst>
-    <p:notesMasterId r:id="rId6"/>
+    <p:notesMasterId r:id="rId5"/>
   </p:notesMasterIdLst>
   <p:sldIdLst>
     <p:sldId id="273" r:id="rId2"/>
     <p:sldId id="259" r:id="rId3"/>
     <p:sldId id="257" r:id="rId4"/>
-    <p:sldId id="261" r:id="rId5"/>
   </p:sldIdLst>
   <p:sldSz cx="9144000" cy="6858000" type="screen4x3"/>
   <p:notesSz cx="7010400" cy="9296400"/>
@@ -5859,8 +5858,8 @@
           <a:chExt cx="0" cy="0"/>
         </a:xfrm>
       </p:grpSpPr>
-      <mc:AlternateContent xmlns:mc="http://schemas.openxmlformats.org/markup-compatibility/2006" xmlns:a14="http://schemas.microsoft.com/office/drawing/2010/main">
-        <mc:Choice Requires="a14">
+      <mc:AlternateContent xmlns:mc="http://schemas.openxmlformats.org/markup-compatibility/2006">
+        <mc:Choice xmlns:a14="http://schemas.microsoft.com/office/drawing/2010/main" Requires="a14">
           <p:sp>
             <p:nvSpPr>
               <p:cNvPr id="3" name="Content Placeholder 2"/>
@@ -6077,7 +6076,7 @@
             </p:txBody>
           </p:sp>
         </mc:Choice>
-        <mc:Fallback xmlns="">
+        <mc:Fallback>
           <p:sp>
             <p:nvSpPr>
               <p:cNvPr id="3" name="Content Placeholder 2"/>
@@ -6096,7 +6095,7 @@
               <a:blipFill>
                 <a:blip r:embed="rId2"/>
                 <a:stretch>
-                  <a:fillRect l="-804" t="-1374" b="-26923"/>
+                  <a:fillRect l="-804" t="-1370" b="-26849"/>
                 </a:stretch>
               </a:blipFill>
             </p:spPr>
@@ -6949,644 +6948,6 @@
 </p:sld>
 </file>
 
-<file path=ppt/slides/slide4.xml><?xml version="1.0" encoding="utf-8"?>
-<p:sld xmlns:a="http://schemas.openxmlformats.org/drawingml/2006/main" xmlns:r="http://schemas.openxmlformats.org/officeDocument/2006/relationships" xmlns:p="http://schemas.openxmlformats.org/presentationml/2006/main">
-  <p:cSld>
-    <p:spTree>
-      <p:nvGrpSpPr>
-        <p:cNvPr id="1" name=""/>
-        <p:cNvGrpSpPr/>
-        <p:nvPr/>
-      </p:nvGrpSpPr>
-      <p:grpSpPr>
-        <a:xfrm>
-          <a:off x="0" y="0"/>
-          <a:ext cx="0" cy="0"/>
-          <a:chOff x="0" y="0"/>
-          <a:chExt cx="0" cy="0"/>
-        </a:xfrm>
-      </p:grpSpPr>
-      <p:sp>
-        <p:nvSpPr>
-          <p:cNvPr id="2" name="Title 1"/>
-          <p:cNvSpPr>
-            <a:spLocks noGrp="1"/>
-          </p:cNvSpPr>
-          <p:nvPr>
-            <p:ph type="title"/>
-          </p:nvPr>
-        </p:nvSpPr>
-        <p:spPr/>
-        <p:txBody>
-          <a:bodyPr/>
-          <a:lstStyle/>
-          <a:p>
-            <a:r>
-              <a:rPr lang="en-US" dirty="0">
-                <a:latin typeface="Times" panose="02020603050405020304" pitchFamily="18" charset="0"/>
-                <a:cs typeface="Times" panose="02020603050405020304" pitchFamily="18" charset="0"/>
-              </a:rPr>
-              <a:t>Hints</a:t>
-            </a:r>
-          </a:p>
-        </p:txBody>
-      </p:sp>
-      <p:sp>
-        <p:nvSpPr>
-          <p:cNvPr id="3" name="Content Placeholder 2"/>
-          <p:cNvSpPr>
-            <a:spLocks noGrp="1"/>
-          </p:cNvSpPr>
-          <p:nvPr>
-            <p:ph idx="1"/>
-          </p:nvPr>
-        </p:nvSpPr>
-        <p:spPr/>
-        <p:txBody>
-          <a:bodyPr>
-            <a:normAutofit fontScale="85000" lnSpcReduction="20000"/>
-          </a:bodyPr>
-          <a:lstStyle/>
-          <a:p>
-            <a:r>
-              <a:rPr lang="en-US" dirty="0">
-                <a:latin typeface="Times" panose="02020603050405020304" pitchFamily="18" charset="0"/>
-                <a:cs typeface="Times" panose="02020603050405020304" pitchFamily="18" charset="0"/>
-              </a:rPr>
-              <a:t>Be careful of the units [do everything in seconds]</a:t>
-            </a:r>
-          </a:p>
-          <a:p>
-            <a:r>
-              <a:rPr lang="en-US" dirty="0" err="1">
-                <a:latin typeface="Times" panose="02020603050405020304" pitchFamily="18" charset="0"/>
-                <a:cs typeface="Times" panose="02020603050405020304" pitchFamily="18" charset="0"/>
-              </a:rPr>
-              <a:t>Vectorize</a:t>
-            </a:r>
-            <a:endParaRPr lang="en-US" dirty="0">
-              <a:latin typeface="Times" panose="02020603050405020304" pitchFamily="18" charset="0"/>
-              <a:cs typeface="Times" panose="02020603050405020304" pitchFamily="18" charset="0"/>
-            </a:endParaRPr>
-          </a:p>
-          <a:p>
-            <a:r>
-              <a:rPr lang="en-US" dirty="0">
-                <a:latin typeface="Times" panose="02020603050405020304" pitchFamily="18" charset="0"/>
-                <a:cs typeface="Times" panose="02020603050405020304" pitchFamily="18" charset="0"/>
-              </a:rPr>
-              <a:t>Finite difference version of second derivative is:</a:t>
-            </a:r>
-          </a:p>
-          <a:p>
-            <a:endParaRPr lang="en-US" dirty="0">
-              <a:latin typeface="Times" panose="02020603050405020304" pitchFamily="18" charset="0"/>
-              <a:cs typeface="Times" panose="02020603050405020304" pitchFamily="18" charset="0"/>
-            </a:endParaRPr>
-          </a:p>
-          <a:p>
-            <a:endParaRPr lang="en-US" dirty="0">
-              <a:latin typeface="Times" panose="02020603050405020304" pitchFamily="18" charset="0"/>
-              <a:cs typeface="Times" panose="02020603050405020304" pitchFamily="18" charset="0"/>
-            </a:endParaRPr>
-          </a:p>
-          <a:p>
-            <a:r>
-              <a:rPr lang="en-US" dirty="0">
-                <a:latin typeface="Times" panose="02020603050405020304" pitchFamily="18" charset="0"/>
-                <a:cs typeface="Times" panose="02020603050405020304" pitchFamily="18" charset="0"/>
-              </a:rPr>
-              <a:t> think carefully about the basal boundary condition</a:t>
-            </a:r>
-          </a:p>
-          <a:p>
-            <a:r>
-              <a:rPr lang="en-US" dirty="0">
-                <a:latin typeface="Times" panose="02020603050405020304" pitchFamily="18" charset="0"/>
-                <a:cs typeface="Times" panose="02020603050405020304" pitchFamily="18" charset="0"/>
-              </a:rPr>
-              <a:t>When you have a script to evolve T forward in time, make another one that calls the first script with different values of the parameters.</a:t>
-            </a:r>
-          </a:p>
-          <a:p>
-            <a:r>
-              <a:rPr lang="en-US" dirty="0">
-                <a:latin typeface="Times" panose="02020603050405020304" pitchFamily="18" charset="0"/>
-                <a:cs typeface="Times" panose="02020603050405020304" pitchFamily="18" charset="0"/>
-              </a:rPr>
-              <a:t>Make many versions: </a:t>
-            </a:r>
-            <a:r>
-              <a:rPr lang="en-US" dirty="0" err="1">
-                <a:latin typeface="Times" panose="02020603050405020304" pitchFamily="18" charset="0"/>
-                <a:cs typeface="Times" panose="02020603050405020304" pitchFamily="18" charset="0"/>
-              </a:rPr>
-              <a:t>ctrl+a</a:t>
-            </a:r>
-            <a:r>
-              <a:rPr lang="en-US" dirty="0">
-                <a:latin typeface="Times" panose="02020603050405020304" pitchFamily="18" charset="0"/>
-                <a:cs typeface="Times" panose="02020603050405020304" pitchFamily="18" charset="0"/>
-              </a:rPr>
-              <a:t>, </a:t>
-            </a:r>
-            <a:r>
-              <a:rPr lang="en-US" dirty="0" err="1">
-                <a:latin typeface="Times" panose="02020603050405020304" pitchFamily="18" charset="0"/>
-                <a:cs typeface="Times" panose="02020603050405020304" pitchFamily="18" charset="0"/>
-              </a:rPr>
-              <a:t>ctrl+c</a:t>
-            </a:r>
-            <a:r>
-              <a:rPr lang="en-US" dirty="0">
-                <a:latin typeface="Times" panose="02020603050405020304" pitchFamily="18" charset="0"/>
-                <a:cs typeface="Times" panose="02020603050405020304" pitchFamily="18" charset="0"/>
-              </a:rPr>
-              <a:t>, </a:t>
-            </a:r>
-            <a:r>
-              <a:rPr lang="en-US" dirty="0" err="1">
-                <a:latin typeface="Times" panose="02020603050405020304" pitchFamily="18" charset="0"/>
-                <a:cs typeface="Times" panose="02020603050405020304" pitchFamily="18" charset="0"/>
-              </a:rPr>
-              <a:t>ctrl+n</a:t>
-            </a:r>
-            <a:r>
-              <a:rPr lang="en-US" dirty="0">
-                <a:latin typeface="Times" panose="02020603050405020304" pitchFamily="18" charset="0"/>
-                <a:cs typeface="Times" panose="02020603050405020304" pitchFamily="18" charset="0"/>
-              </a:rPr>
-              <a:t>, </a:t>
-            </a:r>
-            <a:r>
-              <a:rPr lang="en-US" dirty="0" err="1">
-                <a:latin typeface="Times" panose="02020603050405020304" pitchFamily="18" charset="0"/>
-                <a:cs typeface="Times" panose="02020603050405020304" pitchFamily="18" charset="0"/>
-              </a:rPr>
-              <a:t>ctrl+v</a:t>
-            </a:r>
-            <a:r>
-              <a:rPr lang="en-US" dirty="0">
-                <a:latin typeface="Times" panose="02020603050405020304" pitchFamily="18" charset="0"/>
-                <a:cs typeface="Times" panose="02020603050405020304" pitchFamily="18" charset="0"/>
-              </a:rPr>
-              <a:t>, </a:t>
-            </a:r>
-            <a:r>
-              <a:rPr lang="en-US" dirty="0" err="1">
-                <a:latin typeface="Times" panose="02020603050405020304" pitchFamily="18" charset="0"/>
-                <a:cs typeface="Times" panose="02020603050405020304" pitchFamily="18" charset="0"/>
-              </a:rPr>
-              <a:t>ctrl+s</a:t>
-            </a:r>
-            <a:endParaRPr lang="en-US" dirty="0">
-              <a:latin typeface="Times" panose="02020603050405020304" pitchFamily="18" charset="0"/>
-              <a:cs typeface="Times" panose="02020603050405020304" pitchFamily="18" charset="0"/>
-            </a:endParaRPr>
-          </a:p>
-          <a:p>
-            <a:r>
-              <a:rPr lang="en-US" dirty="0">
-                <a:latin typeface="Times" panose="02020603050405020304" pitchFamily="18" charset="0"/>
-                <a:cs typeface="Times" panose="02020603050405020304" pitchFamily="18" charset="0"/>
-              </a:rPr>
-              <a:t>Structure your code sensibly</a:t>
-            </a:r>
-          </a:p>
-          <a:p>
-            <a:r>
-              <a:rPr lang="en-US" dirty="0">
-                <a:latin typeface="Times" panose="02020603050405020304" pitchFamily="18" charset="0"/>
-                <a:cs typeface="Times" panose="02020603050405020304" pitchFamily="18" charset="0"/>
-              </a:rPr>
-              <a:t>Comment</a:t>
-            </a:r>
-          </a:p>
-          <a:p>
-            <a:endParaRPr lang="en-US" dirty="0">
-              <a:latin typeface="Times" panose="02020603050405020304" pitchFamily="18" charset="0"/>
-              <a:cs typeface="Times" panose="02020603050405020304" pitchFamily="18" charset="0"/>
-            </a:endParaRPr>
-          </a:p>
-          <a:p>
-            <a:endParaRPr lang="en-US" dirty="0">
-              <a:latin typeface="Times" panose="02020603050405020304" pitchFamily="18" charset="0"/>
-              <a:cs typeface="Times" panose="02020603050405020304" pitchFamily="18" charset="0"/>
-            </a:endParaRPr>
-          </a:p>
-        </p:txBody>
-      </p:sp>
-      <mc:AlternateContent xmlns:mc="http://schemas.openxmlformats.org/markup-compatibility/2006" xmlns:a14="http://schemas.microsoft.com/office/drawing/2010/main">
-        <mc:Choice Requires="a14">
-          <p:sp>
-            <p:nvSpPr>
-              <p:cNvPr id="5" name="TextBox 4"/>
-              <p:cNvSpPr txBox="1"/>
-              <p:nvPr/>
-            </p:nvSpPr>
-            <p:spPr>
-              <a:xfrm>
-                <a:off x="2212848" y="2950149"/>
-                <a:ext cx="4131900" cy="874791"/>
-              </a:xfrm>
-              <a:prstGeom prst="rect">
-                <a:avLst/>
-              </a:prstGeom>
-              <a:noFill/>
-            </p:spPr>
-            <p:txBody>
-              <a:bodyPr wrap="none" lIns="0" tIns="0" rIns="0" bIns="0" rtlCol="0">
-                <a:spAutoFit/>
-              </a:bodyPr>
-              <a:lstStyle/>
-              <a:p>
-                <a:pPr/>
-                <a14:m>
-                  <m:oMathPara xmlns:m="http://schemas.openxmlformats.org/officeDocument/2006/math">
-                    <m:oMathParaPr>
-                      <m:jc m:val="centerGroup"/>
-                    </m:oMathParaPr>
-                    <m:oMath xmlns:m="http://schemas.openxmlformats.org/officeDocument/2006/math">
-                      <m:sSub>
-                        <m:sSubPr>
-                          <m:ctrlPr>
-                            <a:rPr lang="en-US" sz="2000" b="0" i="1" smtClean="0">
-                              <a:latin typeface="Cambria Math" panose="02040503050406030204" pitchFamily="18" charset="0"/>
-                            </a:rPr>
-                          </m:ctrlPr>
-                        </m:sSubPr>
-                        <m:e>
-                          <m:d>
-                            <m:dPr>
-                              <m:begChr m:val=""/>
-                              <m:endChr m:val="|"/>
-                              <m:ctrlPr>
-                                <a:rPr lang="en-US" sz="2000" b="0" i="1" smtClean="0">
-                                  <a:latin typeface="Cambria Math" panose="02040503050406030204" pitchFamily="18" charset="0"/>
-                                </a:rPr>
-                              </m:ctrlPr>
-                            </m:dPr>
-                            <m:e>
-                              <m:f>
-                                <m:fPr>
-                                  <m:ctrlPr>
-                                    <a:rPr lang="en-US" sz="2000" b="0" i="1" smtClean="0">
-                                      <a:latin typeface="Cambria Math" panose="02040503050406030204" pitchFamily="18" charset="0"/>
-                                    </a:rPr>
-                                  </m:ctrlPr>
-                                </m:fPr>
-                                <m:num>
-                                  <m:sSup>
-                                    <m:sSupPr>
-                                      <m:ctrlPr>
-                                        <a:rPr lang="en-US" sz="2000" b="0" i="1" smtClean="0">
-                                          <a:latin typeface="Cambria Math" panose="02040503050406030204" pitchFamily="18" charset="0"/>
-                                        </a:rPr>
-                                      </m:ctrlPr>
-                                    </m:sSupPr>
-                                    <m:e>
-                                      <m:r>
-                                        <a:rPr lang="en-US" sz="2000" b="0" i="1" smtClean="0">
-                                          <a:latin typeface="Cambria Math" panose="02040503050406030204" pitchFamily="18" charset="0"/>
-                                        </a:rPr>
-                                        <m:t>𝑑</m:t>
-                                      </m:r>
-                                    </m:e>
-                                    <m:sup>
-                                      <m:r>
-                                        <a:rPr lang="en-US" sz="2000" b="0" i="1" smtClean="0">
-                                          <a:latin typeface="Cambria Math" panose="02040503050406030204" pitchFamily="18" charset="0"/>
-                                        </a:rPr>
-                                        <m:t>2</m:t>
-                                      </m:r>
-                                    </m:sup>
-                                  </m:sSup>
-                                  <m:r>
-                                    <a:rPr lang="en-US" sz="2000" b="0" i="1" smtClean="0">
-                                      <a:latin typeface="Cambria Math" panose="02040503050406030204" pitchFamily="18" charset="0"/>
-                                    </a:rPr>
-                                    <m:t>𝑇</m:t>
-                                  </m:r>
-                                </m:num>
-                                <m:den>
-                                  <m:r>
-                                    <a:rPr lang="en-US" sz="2000" b="0" i="1" smtClean="0">
-                                      <a:latin typeface="Cambria Math" panose="02040503050406030204" pitchFamily="18" charset="0"/>
-                                    </a:rPr>
-                                    <m:t>𝑑</m:t>
-                                  </m:r>
-                                  <m:sSup>
-                                    <m:sSupPr>
-                                      <m:ctrlPr>
-                                        <a:rPr lang="en-US" sz="2000" b="0" i="1" smtClean="0">
-                                          <a:latin typeface="Cambria Math" panose="02040503050406030204" pitchFamily="18" charset="0"/>
-                                        </a:rPr>
-                                      </m:ctrlPr>
-                                    </m:sSupPr>
-                                    <m:e>
-                                      <m:r>
-                                        <a:rPr lang="en-US" sz="2000" b="0" i="1" smtClean="0">
-                                          <a:latin typeface="Cambria Math" panose="02040503050406030204" pitchFamily="18" charset="0"/>
-                                        </a:rPr>
-                                        <m:t>𝑧</m:t>
-                                      </m:r>
-                                    </m:e>
-                                    <m:sup>
-                                      <m:r>
-                                        <a:rPr lang="en-US" sz="2000" b="0" i="1" smtClean="0">
-                                          <a:latin typeface="Cambria Math" panose="02040503050406030204" pitchFamily="18" charset="0"/>
-                                        </a:rPr>
-                                        <m:t>2</m:t>
-                                      </m:r>
-                                    </m:sup>
-                                  </m:sSup>
-                                </m:den>
-                              </m:f>
-                            </m:e>
-                          </m:d>
-                        </m:e>
-                        <m:sub>
-                          <m:r>
-                            <a:rPr lang="en-US" sz="2000" b="0" i="1" smtClean="0">
-                              <a:latin typeface="Cambria Math" panose="02040503050406030204" pitchFamily="18" charset="0"/>
-                            </a:rPr>
-                            <m:t>𝑗</m:t>
-                          </m:r>
-                        </m:sub>
-                      </m:sSub>
-                      <m:r>
-                        <a:rPr lang="en-US" sz="2000" b="0" i="1" smtClean="0">
-                          <a:latin typeface="Cambria Math" panose="02040503050406030204" pitchFamily="18" charset="0"/>
-                        </a:rPr>
-                        <m:t>=</m:t>
-                      </m:r>
-                      <m:f>
-                        <m:fPr>
-                          <m:ctrlPr>
-                            <a:rPr lang="en-US" sz="2000" b="0" i="1" smtClean="0">
-                              <a:latin typeface="Cambria Math" panose="02040503050406030204" pitchFamily="18" charset="0"/>
-                            </a:rPr>
-                          </m:ctrlPr>
-                        </m:fPr>
-                        <m:num>
-                          <m:r>
-                            <a:rPr lang="en-US" sz="2000" b="0" i="1" smtClean="0">
-                              <a:latin typeface="Cambria Math" panose="02040503050406030204" pitchFamily="18" charset="0"/>
-                            </a:rPr>
-                            <m:t>𝑇</m:t>
-                          </m:r>
-                          <m:d>
-                            <m:dPr>
-                              <m:ctrlPr>
-                                <a:rPr lang="en-US" sz="2000" b="0" i="1" smtClean="0">
-                                  <a:latin typeface="Cambria Math" panose="02040503050406030204" pitchFamily="18" charset="0"/>
-                                </a:rPr>
-                              </m:ctrlPr>
-                            </m:dPr>
-                            <m:e>
-                              <m:r>
-                                <a:rPr lang="en-US" sz="2000" b="0" i="1" smtClean="0">
-                                  <a:latin typeface="Cambria Math" panose="02040503050406030204" pitchFamily="18" charset="0"/>
-                                </a:rPr>
-                                <m:t>𝑗</m:t>
-                              </m:r>
-                              <m:r>
-                                <a:rPr lang="en-US" sz="2000" b="0" i="1" smtClean="0">
-                                  <a:latin typeface="Cambria Math" panose="02040503050406030204" pitchFamily="18" charset="0"/>
-                                </a:rPr>
-                                <m:t>+1</m:t>
-                              </m:r>
-                            </m:e>
-                          </m:d>
-                          <m:r>
-                            <a:rPr lang="en-US" sz="2000" b="0" i="1" smtClean="0">
-                              <a:latin typeface="Cambria Math" panose="02040503050406030204" pitchFamily="18" charset="0"/>
-                            </a:rPr>
-                            <m:t>−2</m:t>
-                          </m:r>
-                          <m:r>
-                            <a:rPr lang="en-US" sz="2000" b="0" i="1" smtClean="0">
-                              <a:latin typeface="Cambria Math" panose="02040503050406030204" pitchFamily="18" charset="0"/>
-                            </a:rPr>
-                            <m:t>𝑇</m:t>
-                          </m:r>
-                          <m:d>
-                            <m:dPr>
-                              <m:ctrlPr>
-                                <a:rPr lang="en-US" sz="2000" b="0" i="1" smtClean="0">
-                                  <a:latin typeface="Cambria Math" panose="02040503050406030204" pitchFamily="18" charset="0"/>
-                                </a:rPr>
-                              </m:ctrlPr>
-                            </m:dPr>
-                            <m:e>
-                              <m:r>
-                                <a:rPr lang="en-US" sz="2000" b="0" i="1" smtClean="0">
-                                  <a:latin typeface="Cambria Math" panose="02040503050406030204" pitchFamily="18" charset="0"/>
-                                </a:rPr>
-                                <m:t>𝑗</m:t>
-                              </m:r>
-                            </m:e>
-                          </m:d>
-                          <m:r>
-                            <a:rPr lang="en-US" sz="2000" b="0" i="1" smtClean="0">
-                              <a:latin typeface="Cambria Math" panose="02040503050406030204" pitchFamily="18" charset="0"/>
-                            </a:rPr>
-                            <m:t>+</m:t>
-                          </m:r>
-                          <m:r>
-                            <a:rPr lang="en-US" sz="2000" b="0" i="1" smtClean="0">
-                              <a:latin typeface="Cambria Math" panose="02040503050406030204" pitchFamily="18" charset="0"/>
-                            </a:rPr>
-                            <m:t>𝑇</m:t>
-                          </m:r>
-                          <m:r>
-                            <a:rPr lang="en-US" sz="2000" b="0" i="1" smtClean="0">
-                              <a:latin typeface="Cambria Math" panose="02040503050406030204" pitchFamily="18" charset="0"/>
-                            </a:rPr>
-                            <m:t>(</m:t>
-                          </m:r>
-                          <m:r>
-                            <a:rPr lang="en-US" sz="2000" b="0" i="1" smtClean="0">
-                              <a:latin typeface="Cambria Math" panose="02040503050406030204" pitchFamily="18" charset="0"/>
-                            </a:rPr>
-                            <m:t>𝑗</m:t>
-                          </m:r>
-                          <m:r>
-                            <a:rPr lang="en-US" sz="2000" b="0" i="1" smtClean="0">
-                              <a:latin typeface="Cambria Math" panose="02040503050406030204" pitchFamily="18" charset="0"/>
-                            </a:rPr>
-                            <m:t>−1)</m:t>
-                          </m:r>
-                          <m:r>
-                            <m:rPr>
-                              <m:nor/>
-                            </m:rPr>
-                            <a:rPr lang="en-US" sz="2000" dirty="0"/>
-                            <m:t> </m:t>
-                          </m:r>
-                        </m:num>
-                        <m:den>
-                          <m:r>
-                            <a:rPr lang="en-US" sz="2000" b="0" i="1" smtClean="0">
-                              <a:latin typeface="Cambria Math" panose="02040503050406030204" pitchFamily="18" charset="0"/>
-                              <a:ea typeface="Cambria Math" panose="02040503050406030204" pitchFamily="18" charset="0"/>
-                            </a:rPr>
-                            <m:t>∆</m:t>
-                          </m:r>
-                          <m:sSup>
-                            <m:sSupPr>
-                              <m:ctrlPr>
-                                <a:rPr lang="en-US" sz="2000" b="0" i="1" smtClean="0">
-                                  <a:latin typeface="Cambria Math" panose="02040503050406030204" pitchFamily="18" charset="0"/>
-                                </a:rPr>
-                              </m:ctrlPr>
-                            </m:sSupPr>
-                            <m:e>
-                              <m:r>
-                                <a:rPr lang="en-US" sz="2000" b="0" i="1" smtClean="0">
-                                  <a:latin typeface="Cambria Math" panose="02040503050406030204" pitchFamily="18" charset="0"/>
-                                </a:rPr>
-                                <m:t>𝑧</m:t>
-                              </m:r>
-                            </m:e>
-                            <m:sup>
-                              <m:r>
-                                <a:rPr lang="en-US" sz="2000" b="0" i="1" smtClean="0">
-                                  <a:latin typeface="Cambria Math" panose="02040503050406030204" pitchFamily="18" charset="0"/>
-                                </a:rPr>
-                                <m:t>2</m:t>
-                              </m:r>
-                            </m:sup>
-                          </m:sSup>
-                        </m:den>
-                      </m:f>
-                    </m:oMath>
-                  </m:oMathPara>
-                </a14:m>
-                <a:endParaRPr lang="en-US" sz="2000" dirty="0"/>
-              </a:p>
-            </p:txBody>
-          </p:sp>
-        </mc:Choice>
-        <mc:Fallback xmlns="">
-          <p:sp>
-            <p:nvSpPr>
-              <p:cNvPr id="5" name="TextBox 4"/>
-              <p:cNvSpPr txBox="1">
-                <a:spLocks noRot="1" noChangeAspect="1" noMove="1" noResize="1" noEditPoints="1" noAdjustHandles="1" noChangeArrowheads="1" noChangeShapeType="1" noTextEdit="1"/>
-              </p:cNvSpPr>
-              <p:nvPr/>
-            </p:nvSpPr>
-            <p:spPr>
-              <a:xfrm>
-                <a:off x="2212848" y="2950149"/>
-                <a:ext cx="4131900" cy="874791"/>
-              </a:xfrm>
-              <a:prstGeom prst="rect">
-                <a:avLst/>
-              </a:prstGeom>
-              <a:blipFill>
-                <a:blip r:embed="rId2"/>
-                <a:stretch>
-                  <a:fillRect/>
-                </a:stretch>
-              </a:blipFill>
-            </p:spPr>
-            <p:txBody>
-              <a:bodyPr/>
-              <a:lstStyle/>
-              <a:p>
-                <a:r>
-                  <a:rPr lang="en-US">
-                    <a:noFill/>
-                  </a:rPr>
-                  <a:t> </a:t>
-                </a:r>
-              </a:p>
-            </p:txBody>
-          </p:sp>
-        </mc:Fallback>
-      </mc:AlternateContent>
-      <p:sp>
-        <p:nvSpPr>
-          <p:cNvPr id="4" name="Date Placeholder 3"/>
-          <p:cNvSpPr>
-            <a:spLocks noGrp="1"/>
-          </p:cNvSpPr>
-          <p:nvPr>
-            <p:ph type="dt" sz="half" idx="10"/>
-          </p:nvPr>
-        </p:nvSpPr>
-        <p:spPr/>
-        <p:txBody>
-          <a:bodyPr/>
-          <a:lstStyle/>
-          <a:p>
-            <a:r>
-              <a:rPr lang="en-US"/>
-              <a:t>4/7/2020</a:t>
-            </a:r>
-          </a:p>
-        </p:txBody>
-      </p:sp>
-      <p:sp>
-        <p:nvSpPr>
-          <p:cNvPr id="6" name="Footer Placeholder 5"/>
-          <p:cNvSpPr>
-            <a:spLocks noGrp="1"/>
-          </p:cNvSpPr>
-          <p:nvPr>
-            <p:ph type="ftr" sz="quarter" idx="11"/>
-          </p:nvPr>
-        </p:nvSpPr>
-        <p:spPr/>
-        <p:txBody>
-          <a:bodyPr/>
-          <a:lstStyle/>
-          <a:p>
-            <a:r>
-              <a:rPr lang="en-US"/>
-              <a:t>Practical 5: Heat equation</a:t>
-            </a:r>
-          </a:p>
-        </p:txBody>
-      </p:sp>
-      <p:sp>
-        <p:nvSpPr>
-          <p:cNvPr id="7" name="Slide Number Placeholder 6"/>
-          <p:cNvSpPr>
-            <a:spLocks noGrp="1"/>
-          </p:cNvSpPr>
-          <p:nvPr>
-            <p:ph type="sldNum" sz="quarter" idx="12"/>
-          </p:nvPr>
-        </p:nvSpPr>
-        <p:spPr/>
-        <p:txBody>
-          <a:bodyPr/>
-          <a:lstStyle/>
-          <a:p>
-            <a:fld id="{2BC48BFC-A962-494A-B080-DB0729ABB9A4}" type="slidenum">
-              <a:rPr lang="en-US" smtClean="0"/>
-              <a:t>4</a:t>
-            </a:fld>
-            <a:endParaRPr lang="en-US"/>
-          </a:p>
-        </p:txBody>
-      </p:sp>
-    </p:spTree>
-    <p:extLst>
-      <p:ext uri="{BB962C8B-B14F-4D97-AF65-F5344CB8AC3E}">
-        <p14:creationId xmlns:p14="http://schemas.microsoft.com/office/powerpoint/2010/main" val="2522070273"/>
-      </p:ext>
-    </p:extLst>
-  </p:cSld>
-  <p:clrMapOvr>
-    <a:masterClrMapping/>
-  </p:clrMapOvr>
-</p:sld>
-</file>
-
 <file path=ppt/theme/theme1.xml><?xml version="1.0" encoding="utf-8"?>
 <a:theme xmlns:a="http://schemas.openxmlformats.org/drawingml/2006/main" name="Office Theme">
   <a:themeElements>

</xml_diff>

<commit_message>
add many NBs and ppts
</commit_message>
<xml_diff>
--- a/slides/practicals/P7_EESCGU4220_Heat_equation_2023.pptx
+++ b/slides/practicals/P7_EESCGU4220_Heat_equation_2023.pptx
@@ -6029,36 +6029,36 @@
                   <a:buNone/>
                 </a:pPr>
                 <a:r>
-                  <a:rPr lang="en-US" sz="2000" dirty="0"/>
+                  <a:rPr lang="en-US" sz="1100" dirty="0"/>
                   <a:t>Time-varying T (phase space)</a:t>
                 </a:r>
                 <a:br>
-                  <a:rPr lang="en-US" sz="2000" dirty="0"/>
+                  <a:rPr lang="en-US" sz="1100" dirty="0"/>
                 </a:br>
                 <a:r>
-                  <a:rPr lang="en-US" sz="2000" dirty="0"/>
+                  <a:rPr lang="en-US" sz="1100" dirty="0"/>
                   <a:t>5. Phase space plot (surface </a:t>
                 </a:r>
                 <a:r>
-                  <a:rPr lang="en-US" sz="2000" i="1" dirty="0"/>
+                  <a:rPr lang="en-US" sz="1100" i="1" dirty="0"/>
                   <a:t>T</a:t>
                 </a:r>
                 <a:r>
-                  <a:rPr lang="en-US" sz="2000" dirty="0"/>
+                  <a:rPr lang="en-US" sz="1100" dirty="0"/>
                   <a:t> vs. basal </a:t>
                 </a:r>
                 <a:r>
-                  <a:rPr lang="en-US" sz="2000" i="1" dirty="0"/>
+                  <a:rPr lang="en-US" sz="1100" i="1" dirty="0"/>
                   <a:t>T</a:t>
                 </a:r>
                 <a:r>
-                  <a:rPr lang="en-US" sz="2000" dirty="0"/>
+                  <a:rPr lang="en-US" sz="1100" dirty="0"/>
                   <a:t>) and how that varies with </a:t>
                 </a:r>
                 <a14:m>
                   <m:oMath xmlns:m="http://schemas.openxmlformats.org/officeDocument/2006/math">
                     <m:r>
-                      <a:rPr lang="en-US" sz="2000" i="1">
+                      <a:rPr lang="en-US" sz="1100" i="1">
                         <a:latin typeface="Cambria Math" panose="02040503050406030204" pitchFamily="18" charset="0"/>
                       </a:rPr>
                       <m:t>𝜆</m:t>
@@ -6066,7 +6066,7 @@
                   </m:oMath>
                 </a14:m>
                 <a:r>
-                  <a:rPr lang="en-US" sz="2000" dirty="0"/>
+                  <a:rPr lang="en-US" sz="1100" dirty="0"/>
                   <a:t> </a:t>
                 </a:r>
               </a:p>
@@ -6095,7 +6095,7 @@
               <a:blipFill>
                 <a:blip r:embed="rId2"/>
                 <a:stretch>
-                  <a:fillRect l="-804" t="-1370" b="-26849"/>
+                  <a:fillRect l="-804" t="-1370" b="-20274"/>
                 </a:stretch>
               </a:blipFill>
             </p:spPr>
@@ -6114,8 +6114,8 @@
           </p:sp>
         </mc:Fallback>
       </mc:AlternateContent>
-      <mc:AlternateContent xmlns:mc="http://schemas.openxmlformats.org/markup-compatibility/2006" xmlns:a14="http://schemas.microsoft.com/office/drawing/2010/main">
-        <mc:Choice Requires="a14">
+      <mc:AlternateContent xmlns:mc="http://schemas.openxmlformats.org/markup-compatibility/2006">
+        <mc:Choice xmlns:a14="http://schemas.microsoft.com/office/drawing/2010/main" Requires="a14">
           <p:sp>
             <p:nvSpPr>
               <p:cNvPr id="5" name="TextBox 4"/>
@@ -6124,8 +6124,8 @@
             </p:nvSpPr>
             <p:spPr>
               <a:xfrm>
-                <a:off x="5820371" y="5023892"/>
-                <a:ext cx="2920671" cy="829843"/>
+                <a:off x="6015103" y="6188111"/>
+                <a:ext cx="1439240" cy="350802"/>
               </a:xfrm>
               <a:prstGeom prst="rect">
                 <a:avLst/>
@@ -6151,7 +6151,7 @@
                     </m:oMathParaPr>
                     <m:oMath xmlns:m="http://schemas.openxmlformats.org/officeDocument/2006/math">
                       <m:r>
-                        <a:rPr lang="en-US" sz="2400" i="1" smtClean="0">
+                        <a:rPr lang="en-US" sz="1200" i="1" smtClean="0">
                           <a:latin typeface="Cambria Math" panose="02040503050406030204" pitchFamily="18" charset="0"/>
                         </a:rPr>
                         <m:t>𝑇</m:t>
@@ -6159,20 +6159,20 @@
                       <m:d>
                         <m:dPr>
                           <m:ctrlPr>
-                            <a:rPr lang="en-US" sz="2400" b="0" i="1" smtClean="0">
+                            <a:rPr lang="en-US" sz="1200" b="0" i="1" smtClean="0">
                               <a:latin typeface="Cambria Math" panose="02040503050406030204" pitchFamily="18" charset="0"/>
                             </a:rPr>
                           </m:ctrlPr>
                         </m:dPr>
                         <m:e>
                           <m:r>
-                            <a:rPr lang="en-US" sz="2400" b="0" i="1" smtClean="0">
+                            <a:rPr lang="en-US" sz="1200" b="0" i="1" smtClean="0">
                               <a:latin typeface="Cambria Math" panose="02040503050406030204" pitchFamily="18" charset="0"/>
                             </a:rPr>
                             <m:t>0,</m:t>
                           </m:r>
                           <m:r>
-                            <a:rPr lang="en-US" sz="2400" b="0" i="1" smtClean="0">
+                            <a:rPr lang="en-US" sz="1200" b="0" i="1" smtClean="0">
                               <a:latin typeface="Cambria Math" panose="02040503050406030204" pitchFamily="18" charset="0"/>
                             </a:rPr>
                             <m:t>𝑡</m:t>
@@ -6180,7 +6180,7 @@
                         </m:e>
                       </m:d>
                       <m:r>
-                        <a:rPr lang="en-US" sz="2400" b="0" i="1" smtClean="0">
+                        <a:rPr lang="en-US" sz="1200" b="0" i="1" smtClean="0">
                           <a:latin typeface="Cambria Math" panose="02040503050406030204" pitchFamily="18" charset="0"/>
                         </a:rPr>
                         <m:t>=</m:t>
@@ -6189,13 +6189,13 @@
                         <m:rPr>
                           <m:sty m:val="p"/>
                         </m:rPr>
-                        <a:rPr lang="en-US" sz="2400" b="0" i="0" smtClean="0">
+                        <a:rPr lang="en-US" sz="1200" b="0" i="0" smtClean="0">
                           <a:latin typeface="Cambria Math" panose="02040503050406030204" pitchFamily="18" charset="0"/>
                         </a:rPr>
                         <m:t>A</m:t>
                       </m:r>
                       <m:r>
-                        <a:rPr lang="en-US" sz="2400" b="0" i="0" smtClean="0">
+                        <a:rPr lang="en-US" sz="1200" b="0" i="0" smtClean="0">
                           <a:latin typeface="Cambria Math" panose="02040503050406030204" pitchFamily="18" charset="0"/>
                         </a:rPr>
                         <m:t> </m:t>
@@ -6204,13 +6204,13 @@
                         <m:rPr>
                           <m:sty m:val="p"/>
                         </m:rPr>
-                        <a:rPr lang="en-US" sz="2400" b="0" i="0" smtClean="0">
+                        <a:rPr lang="en-US" sz="1200" b="0" i="0" smtClean="0">
                           <a:latin typeface="Cambria Math" panose="02040503050406030204" pitchFamily="18" charset="0"/>
                         </a:rPr>
                         <m:t>sin</m:t>
                       </m:r>
                       <m:r>
-                        <a:rPr lang="en-US" sz="2400" b="0" i="1" smtClean="0">
+                        <a:rPr lang="en-US" sz="1200" b="0" i="1" smtClean="0">
                           <a:latin typeface="Cambria Math" panose="02040503050406030204" pitchFamily="18" charset="0"/>
                         </a:rPr>
                         <m:t>⁡</m:t>
@@ -6218,7 +6218,7 @@
                       <m:d>
                         <m:dPr>
                           <m:ctrlPr>
-                            <a:rPr lang="en-US" sz="2400" b="0" i="1" smtClean="0">
+                            <a:rPr lang="en-US" sz="1200" b="0" i="1" smtClean="0">
                               <a:latin typeface="Cambria Math" panose="02040503050406030204" pitchFamily="18" charset="0"/>
                             </a:rPr>
                           </m:ctrlPr>
@@ -6227,20 +6227,20 @@
                           <m:f>
                             <m:fPr>
                               <m:ctrlPr>
-                                <a:rPr lang="en-US" sz="2400" i="1">
+                                <a:rPr lang="en-US" sz="1200" i="1">
                                   <a:latin typeface="Cambria Math" panose="02040503050406030204" pitchFamily="18" charset="0"/>
                                 </a:rPr>
                               </m:ctrlPr>
                             </m:fPr>
                             <m:num>
                               <m:r>
-                                <a:rPr lang="en-US" sz="2400" i="1">
+                                <a:rPr lang="en-US" sz="1200" i="1">
                                   <a:latin typeface="Cambria Math" panose="02040503050406030204" pitchFamily="18" charset="0"/>
                                 </a:rPr>
                                 <m:t>2</m:t>
                               </m:r>
                               <m:r>
-                                <a:rPr lang="en-US" sz="2400" i="1">
+                                <a:rPr lang="en-US" sz="1200" i="1">
                                   <a:latin typeface="Cambria Math" panose="02040503050406030204" pitchFamily="18" charset="0"/>
                                 </a:rPr>
                                 <m:t>𝜋</m:t>
@@ -6248,7 +6248,7 @@
                             </m:num>
                             <m:den>
                               <m:r>
-                                <a:rPr lang="en-US" sz="2400" i="1">
+                                <a:rPr lang="en-US" sz="1200" i="1">
                                   <a:latin typeface="Cambria Math" panose="02040503050406030204" pitchFamily="18" charset="0"/>
                                 </a:rPr>
                                 <m:t>𝜆</m:t>
@@ -6256,7 +6256,7 @@
                             </m:den>
                           </m:f>
                           <m:r>
-                            <a:rPr lang="en-US" sz="2400" i="1">
+                            <a:rPr lang="en-US" sz="1200" i="1">
                               <a:latin typeface="Cambria Math" panose="02040503050406030204" pitchFamily="18" charset="0"/>
                             </a:rPr>
                             <m:t>𝑡</m:t>
@@ -6266,12 +6266,12 @@
                     </m:oMath>
                   </m:oMathPara>
                 </a14:m>
-                <a:endParaRPr lang="en-US" sz="2400" dirty="0"/>
+                <a:endParaRPr lang="en-US" sz="1200" dirty="0"/>
               </a:p>
             </p:txBody>
           </p:sp>
         </mc:Choice>
-        <mc:Fallback xmlns="">
+        <mc:Fallback>
           <p:sp>
             <p:nvSpPr>
               <p:cNvPr id="5" name="TextBox 4"/>
@@ -6282,8 +6282,8 @@
             </p:nvSpPr>
             <p:spPr>
               <a:xfrm>
-                <a:off x="5820371" y="5023892"/>
-                <a:ext cx="2920671" cy="829843"/>
+                <a:off x="6015103" y="6188111"/>
+                <a:ext cx="1439240" cy="350802"/>
               </a:xfrm>
               <a:prstGeom prst="rect">
                 <a:avLst/>
@@ -6291,7 +6291,7 @@
               <a:blipFill>
                 <a:blip r:embed="rId3"/>
                 <a:stretch>
-                  <a:fillRect/>
+                  <a:fillRect l="-1739" b="-10000"/>
                 </a:stretch>
               </a:blipFill>
               <a:ln>

</xml_diff>